<commit_message>
final update on data engineering mini project
</commit_message>
<xml_diff>
--- a/DE_mini_project/docs/DE Mini Project DSLS 2023_Ihsan Nur Faqih.pptx
+++ b/DE_mini_project/docs/DE Mini Project DSLS 2023_Ihsan Nur Faqih.pptx
@@ -6693,6 +6693,20 @@
 <file path=ppt/slides/slide2.xml><?xml version="1.0" encoding="utf-8"?>
 <p:sld xmlns:a="http://schemas.openxmlformats.org/drawingml/2006/main" xmlns:r="http://schemas.openxmlformats.org/officeDocument/2006/relationships" xmlns:p="http://schemas.openxmlformats.org/presentationml/2006/main">
   <p:cSld>
+    <p:bg>
+      <p:bgPr>
+        <a:blipFill dpi="0" rotWithShape="1">
+          <a:blip r:embed="rId2">
+            <a:lum/>
+          </a:blip>
+          <a:srcRect/>
+          <a:stretch>
+            <a:fillRect/>
+          </a:stretch>
+        </a:blipFill>
+        <a:effectLst/>
+      </p:bgPr>
+    </p:bg>
     <p:spTree>
       <p:nvGrpSpPr>
         <p:cNvPr id="1" name=""/>
@@ -6744,48 +6758,6 @@
             <a:endParaRPr lang="id-ID" sz="3200" b="1" dirty="0">
               <a:latin typeface="+mn-lt"/>
             </a:endParaRPr>
-          </a:p>
-        </p:txBody>
-      </p:sp>
-      <p:sp>
-        <p:nvSpPr>
-          <p:cNvPr id="3" name="Content Placeholder 2">
-            <a:extLst>
-              <a:ext uri="{FF2B5EF4-FFF2-40B4-BE49-F238E27FC236}">
-                <a16:creationId xmlns:a16="http://schemas.microsoft.com/office/drawing/2014/main" id="{48FF996A-F4A2-AA5C-2C18-4DCBB34C1CB9}"/>
-              </a:ext>
-            </a:extLst>
-          </p:cNvPr>
-          <p:cNvSpPr>
-            <a:spLocks noGrp="1"/>
-          </p:cNvSpPr>
-          <p:nvPr>
-            <p:ph idx="1"/>
-          </p:nvPr>
-        </p:nvSpPr>
-        <p:spPr>
-          <a:xfrm>
-            <a:off x="344130" y="1052052"/>
-            <a:ext cx="11700386" cy="5329083"/>
-          </a:xfrm>
-        </p:spPr>
-        <p:txBody>
-          <a:bodyPr/>
-          <a:lstStyle/>
-          <a:p>
-            <a:r>
-              <a:rPr lang="en-US" dirty="0"/>
-              <a:t>Generating </a:t>
-            </a:r>
-            <a:r>
-              <a:rPr lang="en-US" b="1" dirty="0"/>
-              <a:t>OrderFact</a:t>
-            </a:r>
-            <a:r>
-              <a:rPr lang="en-US" dirty="0"/>
-              <a:t> (will be used for Product Analysis) </a:t>
-            </a:r>
-            <a:endParaRPr lang="id-ID" dirty="0"/>
           </a:p>
         </p:txBody>
       </p:sp>
@@ -6841,73 +6813,34 @@
           </a:p>
         </p:txBody>
       </p:sp>
-      <p:pic>
-        <p:nvPicPr>
-          <p:cNvPr id="6" name="Picture 5" descr="Diagram, schematic">
-            <a:extLst>
-              <a:ext uri="{FF2B5EF4-FFF2-40B4-BE49-F238E27FC236}">
-                <a16:creationId xmlns:a16="http://schemas.microsoft.com/office/drawing/2014/main" id="{206AA5E1-EEB1-A668-73F3-838390BCC393}"/>
-              </a:ext>
-            </a:extLst>
-          </p:cNvPr>
-          <p:cNvPicPr>
-            <a:picLocks noChangeAspect="1"/>
-          </p:cNvPicPr>
+      <p:sp>
+        <p:nvSpPr>
+          <p:cNvPr id="10" name="Rectangle 9">
+            <a:extLst>
+              <a:ext uri="{FF2B5EF4-FFF2-40B4-BE49-F238E27FC236}">
+                <a16:creationId xmlns:a16="http://schemas.microsoft.com/office/drawing/2014/main" id="{B649CDA4-2792-1DC8-B3E2-748C7977A181}"/>
+              </a:ext>
+            </a:extLst>
+          </p:cNvPr>
+          <p:cNvSpPr/>
           <p:nvPr/>
-        </p:nvPicPr>
-        <p:blipFill>
-          <a:blip r:embed="rId2">
-            <a:extLst>
-              <a:ext uri="{28A0092B-C50C-407E-A947-70E740481C1C}">
-                <a14:useLocalDpi xmlns:a14="http://schemas.microsoft.com/office/drawing/2010/main" val="0"/>
-              </a:ext>
-            </a:extLst>
-          </a:blip>
-          <a:stretch>
-            <a:fillRect/>
-          </a:stretch>
-        </p:blipFill>
-        <p:spPr>
-          <a:xfrm>
-            <a:off x="344130" y="1470603"/>
-            <a:ext cx="8780205" cy="4414003"/>
+        </p:nvSpPr>
+        <p:spPr>
+          <a:xfrm>
+            <a:off x="634702" y="1097281"/>
+            <a:ext cx="2420470" cy="1699708"/>
           </a:xfrm>
           <a:prstGeom prst="rect">
             <a:avLst/>
           </a:prstGeom>
+          <a:solidFill>
+            <a:srgbClr val="12858C">
+              <a:alpha val="31000"/>
+            </a:srgbClr>
+          </a:solidFill>
           <a:ln>
-            <a:solidFill>
-              <a:schemeClr val="tx1"/>
-            </a:solidFill>
+            <a:noFill/>
           </a:ln>
-        </p:spPr>
-      </p:pic>
-      <p:sp>
-        <p:nvSpPr>
-          <p:cNvPr id="7" name="Speech Bubble: Rectangle 6">
-            <a:extLst>
-              <a:ext uri="{FF2B5EF4-FFF2-40B4-BE49-F238E27FC236}">
-                <a16:creationId xmlns:a16="http://schemas.microsoft.com/office/drawing/2014/main" id="{5F5F13C9-89A0-4C93-56CE-8EE5345B84CD}"/>
-              </a:ext>
-            </a:extLst>
-          </p:cNvPr>
-          <p:cNvSpPr/>
-          <p:nvPr/>
-        </p:nvSpPr>
-        <p:spPr>
-          <a:xfrm>
-            <a:off x="9350476" y="1470602"/>
-            <a:ext cx="2576053" cy="2649113"/>
-          </a:xfrm>
-          <a:prstGeom prst="wedgeRectCallout">
-            <a:avLst>
-              <a:gd name="adj1" fmla="val -58543"/>
-              <a:gd name="adj2" fmla="val 24515"/>
-            </a:avLst>
-          </a:prstGeom>
-          <a:solidFill>
-            <a:schemeClr val="bg1"/>
-          </a:solidFill>
         </p:spPr>
         <p:style>
           <a:lnRef idx="2">
@@ -6929,30 +6862,440 @@
           <a:bodyPr rtlCol="0" anchor="ctr"/>
           <a:lstStyle/>
           <a:p>
+            <a:pPr algn="ctr"/>
+            <a:r>
+              <a:rPr lang="en-US" sz="2400" b="1" dirty="0">
+                <a:solidFill>
+                  <a:schemeClr val="tx1"/>
+                </a:solidFill>
+              </a:rPr>
+              <a:t>Product Perspective</a:t>
+            </a:r>
+          </a:p>
+        </p:txBody>
+      </p:sp>
+      <p:sp>
+        <p:nvSpPr>
+          <p:cNvPr id="11" name="Rectangle 10">
+            <a:extLst>
+              <a:ext uri="{FF2B5EF4-FFF2-40B4-BE49-F238E27FC236}">
+                <a16:creationId xmlns:a16="http://schemas.microsoft.com/office/drawing/2014/main" id="{BDE9F282-4A91-023C-103B-CA7FBBBB106F}"/>
+              </a:ext>
+            </a:extLst>
+          </p:cNvPr>
+          <p:cNvSpPr/>
+          <p:nvPr/>
+        </p:nvSpPr>
+        <p:spPr>
+          <a:xfrm>
+            <a:off x="634701" y="2796989"/>
+            <a:ext cx="2420470" cy="1699708"/>
+          </a:xfrm>
+          <a:prstGeom prst="rect">
+            <a:avLst/>
+          </a:prstGeom>
+          <a:solidFill>
+            <a:srgbClr val="12858C">
+              <a:alpha val="69000"/>
+            </a:srgbClr>
+          </a:solidFill>
+          <a:ln>
+            <a:noFill/>
+          </a:ln>
+        </p:spPr>
+        <p:style>
+          <a:lnRef idx="2">
+            <a:schemeClr val="accent1">
+              <a:shade val="50000"/>
+            </a:schemeClr>
+          </a:lnRef>
+          <a:fillRef idx="1">
+            <a:schemeClr val="accent1"/>
+          </a:fillRef>
+          <a:effectRef idx="0">
+            <a:schemeClr val="accent1"/>
+          </a:effectRef>
+          <a:fontRef idx="minor">
+            <a:schemeClr val="lt1"/>
+          </a:fontRef>
+        </p:style>
+        <p:txBody>
+          <a:bodyPr rtlCol="0" anchor="ctr"/>
+          <a:lstStyle/>
+          <a:p>
+            <a:pPr algn="ctr"/>
+            <a:r>
+              <a:rPr lang="en-US" sz="2400" b="1" dirty="0">
+                <a:solidFill>
+                  <a:schemeClr val="tx1"/>
+                </a:solidFill>
+              </a:rPr>
+              <a:t>Customer Perspective</a:t>
+            </a:r>
+          </a:p>
+        </p:txBody>
+      </p:sp>
+      <p:sp>
+        <p:nvSpPr>
+          <p:cNvPr id="12" name="Rectangle 11">
+            <a:extLst>
+              <a:ext uri="{FF2B5EF4-FFF2-40B4-BE49-F238E27FC236}">
+                <a16:creationId xmlns:a16="http://schemas.microsoft.com/office/drawing/2014/main" id="{ABF3002D-B3F2-1CBB-4132-20B0BF372B0E}"/>
+              </a:ext>
+            </a:extLst>
+          </p:cNvPr>
+          <p:cNvSpPr/>
+          <p:nvPr/>
+        </p:nvSpPr>
+        <p:spPr>
+          <a:xfrm>
+            <a:off x="634702" y="4496697"/>
+            <a:ext cx="2420470" cy="1699708"/>
+          </a:xfrm>
+          <a:prstGeom prst="rect">
+            <a:avLst/>
+          </a:prstGeom>
+          <a:solidFill>
+            <a:srgbClr val="12858C">
+              <a:alpha val="91000"/>
+            </a:srgbClr>
+          </a:solidFill>
+          <a:ln>
+            <a:noFill/>
+          </a:ln>
+        </p:spPr>
+        <p:style>
+          <a:lnRef idx="2">
+            <a:schemeClr val="accent1">
+              <a:shade val="50000"/>
+            </a:schemeClr>
+          </a:lnRef>
+          <a:fillRef idx="1">
+            <a:schemeClr val="accent1"/>
+          </a:fillRef>
+          <a:effectRef idx="0">
+            <a:schemeClr val="accent1"/>
+          </a:effectRef>
+          <a:fontRef idx="minor">
+            <a:schemeClr val="lt1"/>
+          </a:fontRef>
+        </p:style>
+        <p:txBody>
+          <a:bodyPr rtlCol="0" anchor="ctr"/>
+          <a:lstStyle/>
+          <a:p>
+            <a:pPr algn="ctr"/>
+            <a:r>
+              <a:rPr lang="en-US" sz="2400" b="1" dirty="0">
+                <a:solidFill>
+                  <a:schemeClr val="tx1"/>
+                </a:solidFill>
+              </a:rPr>
+              <a:t>Customer Retention</a:t>
+            </a:r>
+          </a:p>
+        </p:txBody>
+      </p:sp>
+      <p:sp>
+        <p:nvSpPr>
+          <p:cNvPr id="13" name="Rectangle 12">
+            <a:extLst>
+              <a:ext uri="{FF2B5EF4-FFF2-40B4-BE49-F238E27FC236}">
+                <a16:creationId xmlns:a16="http://schemas.microsoft.com/office/drawing/2014/main" id="{03C3BBA1-D002-813E-3046-E2D6141EFCA7}"/>
+              </a:ext>
+            </a:extLst>
+          </p:cNvPr>
+          <p:cNvSpPr/>
+          <p:nvPr/>
+        </p:nvSpPr>
+        <p:spPr>
+          <a:xfrm>
+            <a:off x="3055171" y="1097282"/>
+            <a:ext cx="7971417" cy="1699708"/>
+          </a:xfrm>
+          <a:prstGeom prst="rect">
+            <a:avLst/>
+          </a:prstGeom>
+          <a:solidFill>
+            <a:schemeClr val="bg1">
+              <a:lumMod val="85000"/>
+            </a:schemeClr>
+          </a:solidFill>
+          <a:ln>
+            <a:noFill/>
+          </a:ln>
+        </p:spPr>
+        <p:style>
+          <a:lnRef idx="2">
+            <a:schemeClr val="accent1">
+              <a:shade val="50000"/>
+            </a:schemeClr>
+          </a:lnRef>
+          <a:fillRef idx="1">
+            <a:schemeClr val="accent1"/>
+          </a:fillRef>
+          <a:effectRef idx="0">
+            <a:schemeClr val="accent1"/>
+          </a:effectRef>
+          <a:fontRef idx="minor">
+            <a:schemeClr val="lt1"/>
+          </a:fontRef>
+        </p:style>
+        <p:txBody>
+          <a:bodyPr rtlCol="0" anchor="ctr"/>
+          <a:lstStyle/>
+          <a:p>
+            <a:pPr marL="285750" indent="-285750">
+              <a:buFont typeface="Arial" panose="020B0604020202020204" pitchFamily="34" charset="0"/>
+              <a:buChar char="•"/>
+            </a:pPr>
             <a:r>
               <a:rPr lang="en-US" sz="1600" b="1" dirty="0">
                 <a:solidFill>
                   <a:schemeClr val="tx1"/>
                 </a:solidFill>
               </a:rPr>
-              <a:t>OrderFact :</a:t>
-            </a:r>
-          </a:p>
-          <a:p>
-            <a:endParaRPr lang="en-US" sz="1600" b="1" dirty="0">
-              <a:solidFill>
-                <a:schemeClr val="tx1"/>
-              </a:solidFill>
-            </a:endParaRPr>
-          </a:p>
-          <a:p>
+              <a:t>Sales performance in 1997 is stagnant and driven by several event (Christmas &amp; New Year)</a:t>
+            </a:r>
+          </a:p>
+          <a:p>
+            <a:pPr marL="285750" indent="-285750">
+              <a:buFont typeface="Arial" panose="020B0604020202020204" pitchFamily="34" charset="0"/>
+              <a:buChar char="•"/>
+            </a:pPr>
             <a:r>
               <a:rPr lang="en-US" sz="1600" b="1" dirty="0">
                 <a:solidFill>
                   <a:schemeClr val="tx1"/>
                 </a:solidFill>
               </a:rPr>
-              <a:t>A view table in Northwind DB that can be used by data analyst to analyze product sold over times (including category, price, quantity, discount applied), from which supplier, how the freight are made, etc.</a:t>
+              <a:t>Bucket size of each customer varied and have range from 500-600 USD/transaction</a:t>
+            </a:r>
+          </a:p>
+          <a:p>
+            <a:pPr marL="285750" indent="-285750">
+              <a:buFont typeface="Arial" panose="020B0604020202020204" pitchFamily="34" charset="0"/>
+              <a:buChar char="•"/>
+            </a:pPr>
+            <a:r>
+              <a:rPr lang="en-US" sz="1600" b="1" dirty="0">
+                <a:solidFill>
+                  <a:schemeClr val="tx1"/>
+                </a:solidFill>
+              </a:rPr>
+              <a:t>Sales revenue mainly driven by Dairy Products, Beverages, Convection, and Meat/Poultry</a:t>
+            </a:r>
+          </a:p>
+          <a:p>
+            <a:pPr marL="285750" indent="-285750">
+              <a:buFont typeface="Arial" panose="020B0604020202020204" pitchFamily="34" charset="0"/>
+              <a:buChar char="•"/>
+            </a:pPr>
+            <a:r>
+              <a:rPr lang="en-US" sz="1600" b="1" dirty="0">
+                <a:solidFill>
+                  <a:schemeClr val="tx1"/>
+                </a:solidFill>
+              </a:rPr>
+              <a:t>Product bundling might be good solution to increase bucket size and overall revenue</a:t>
+            </a:r>
+          </a:p>
+        </p:txBody>
+      </p:sp>
+      <p:sp>
+        <p:nvSpPr>
+          <p:cNvPr id="14" name="Rectangle 13">
+            <a:extLst>
+              <a:ext uri="{FF2B5EF4-FFF2-40B4-BE49-F238E27FC236}">
+                <a16:creationId xmlns:a16="http://schemas.microsoft.com/office/drawing/2014/main" id="{401E9111-A54C-63DA-DEB7-9A2E89CBDBE3}"/>
+              </a:ext>
+            </a:extLst>
+          </p:cNvPr>
+          <p:cNvSpPr/>
+          <p:nvPr/>
+        </p:nvSpPr>
+        <p:spPr>
+          <a:xfrm>
+            <a:off x="3055171" y="2796989"/>
+            <a:ext cx="7971417" cy="1699708"/>
+          </a:xfrm>
+          <a:prstGeom prst="rect">
+            <a:avLst/>
+          </a:prstGeom>
+          <a:solidFill>
+            <a:schemeClr val="bg1">
+              <a:lumMod val="85000"/>
+            </a:schemeClr>
+          </a:solidFill>
+          <a:ln>
+            <a:noFill/>
+          </a:ln>
+        </p:spPr>
+        <p:style>
+          <a:lnRef idx="2">
+            <a:schemeClr val="accent1">
+              <a:shade val="50000"/>
+            </a:schemeClr>
+          </a:lnRef>
+          <a:fillRef idx="1">
+            <a:schemeClr val="accent1"/>
+          </a:fillRef>
+          <a:effectRef idx="0">
+            <a:schemeClr val="accent1"/>
+          </a:effectRef>
+          <a:fontRef idx="minor">
+            <a:schemeClr val="lt1"/>
+          </a:fontRef>
+        </p:style>
+        <p:txBody>
+          <a:bodyPr rtlCol="0" anchor="ctr"/>
+          <a:lstStyle/>
+          <a:p>
+            <a:pPr marL="285750" indent="-285750">
+              <a:buFont typeface="Arial" panose="020B0604020202020204" pitchFamily="34" charset="0"/>
+              <a:buChar char="•"/>
+            </a:pPr>
+            <a:r>
+              <a:rPr lang="en-US" sz="1600" b="1" dirty="0">
+                <a:solidFill>
+                  <a:schemeClr val="tx1"/>
+                </a:solidFill>
+              </a:rPr>
+              <a:t>Mostly our customer are in hibernating &amp; at-risk state that have potential losing 33 customers and 6.000 USD average sales/year</a:t>
+            </a:r>
+          </a:p>
+          <a:p>
+            <a:pPr marL="285750" indent="-285750">
+              <a:buFont typeface="Arial" panose="020B0604020202020204" pitchFamily="34" charset="0"/>
+              <a:buChar char="•"/>
+            </a:pPr>
+            <a:r>
+              <a:rPr lang="en-US" sz="1600" b="1" dirty="0">
+                <a:solidFill>
+                  <a:schemeClr val="tx1"/>
+                </a:solidFill>
+              </a:rPr>
+              <a:t>Reward strategy for Loyal Customer, Potential Loyalist, and Champions are needed to increase their sales bin (potential gain 41.000 USD average sales/year)</a:t>
+            </a:r>
+          </a:p>
+          <a:p>
+            <a:pPr marL="285750" indent="-285750">
+              <a:buFont typeface="Arial" panose="020B0604020202020204" pitchFamily="34" charset="0"/>
+              <a:buChar char="•"/>
+            </a:pPr>
+            <a:r>
+              <a:rPr lang="en-US" sz="1600" b="1" dirty="0">
+                <a:solidFill>
+                  <a:schemeClr val="tx1"/>
+                </a:solidFill>
+              </a:rPr>
+              <a:t>There is a customer that segmented as  “can not lost” that have 23.000 USD average sales/year must be maintained</a:t>
+            </a:r>
+          </a:p>
+        </p:txBody>
+      </p:sp>
+      <p:sp>
+        <p:nvSpPr>
+          <p:cNvPr id="15" name="Rectangle 14">
+            <a:extLst>
+              <a:ext uri="{FF2B5EF4-FFF2-40B4-BE49-F238E27FC236}">
+                <a16:creationId xmlns:a16="http://schemas.microsoft.com/office/drawing/2014/main" id="{D759FF57-2477-8549-6341-C37E72DB8954}"/>
+              </a:ext>
+            </a:extLst>
+          </p:cNvPr>
+          <p:cNvSpPr/>
+          <p:nvPr/>
+        </p:nvSpPr>
+        <p:spPr>
+          <a:xfrm>
+            <a:off x="3055171" y="4496697"/>
+            <a:ext cx="7971417" cy="1699708"/>
+          </a:xfrm>
+          <a:prstGeom prst="rect">
+            <a:avLst/>
+          </a:prstGeom>
+          <a:solidFill>
+            <a:schemeClr val="bg1">
+              <a:lumMod val="85000"/>
+            </a:schemeClr>
+          </a:solidFill>
+          <a:ln>
+            <a:noFill/>
+          </a:ln>
+        </p:spPr>
+        <p:style>
+          <a:lnRef idx="2">
+            <a:schemeClr val="accent1">
+              <a:shade val="50000"/>
+            </a:schemeClr>
+          </a:lnRef>
+          <a:fillRef idx="1">
+            <a:schemeClr val="accent1"/>
+          </a:fillRef>
+          <a:effectRef idx="0">
+            <a:schemeClr val="accent1"/>
+          </a:effectRef>
+          <a:fontRef idx="minor">
+            <a:schemeClr val="lt1"/>
+          </a:fontRef>
+        </p:style>
+        <p:txBody>
+          <a:bodyPr rtlCol="0" anchor="ctr"/>
+          <a:lstStyle/>
+          <a:p>
+            <a:pPr marL="355600" indent="-285750">
+              <a:buFont typeface="Arial" panose="020B0604020202020204" pitchFamily="34" charset="0"/>
+              <a:buChar char="•"/>
+            </a:pPr>
+            <a:r>
+              <a:rPr lang="en-US" sz="1600" b="1" dirty="0">
+                <a:solidFill>
+                  <a:schemeClr val="tx1"/>
+                </a:solidFill>
+              </a:rPr>
+              <a:t>From the cohort chart we can inference that there is very high fluctuation over time in customer retention</a:t>
+            </a:r>
+          </a:p>
+          <a:p>
+            <a:pPr marL="355600" indent="-285750">
+              <a:buFont typeface="Arial" panose="020B0604020202020204" pitchFamily="34" charset="0"/>
+              <a:buChar char="•"/>
+            </a:pPr>
+            <a:r>
+              <a:rPr lang="en-US" sz="1600" b="1" dirty="0">
+                <a:solidFill>
+                  <a:schemeClr val="tx1"/>
+                </a:solidFill>
+              </a:rPr>
+              <a:t>Average retention rate for every cohort are below 50%</a:t>
+            </a:r>
+          </a:p>
+          <a:p>
+            <a:pPr marL="355600" indent="-285750">
+              <a:buFont typeface="Arial" panose="020B0604020202020204" pitchFamily="34" charset="0"/>
+              <a:buChar char="•"/>
+            </a:pPr>
+            <a:r>
+              <a:rPr lang="en-US" sz="1600" b="1" dirty="0">
+                <a:solidFill>
+                  <a:schemeClr val="tx1"/>
+                </a:solidFill>
+              </a:rPr>
+              <a:t>Buyers from first cohort (1997-01) seems have better retention than another cohort, since a year from first purchase the retention rate still in 52%</a:t>
+            </a:r>
+          </a:p>
+          <a:p>
+            <a:pPr marL="355600" indent="-285750">
+              <a:buFont typeface="Arial" panose="020B0604020202020204" pitchFamily="34" charset="0"/>
+              <a:buChar char="•"/>
+            </a:pPr>
+            <a:r>
+              <a:rPr lang="en-US" sz="1600" b="1" dirty="0">
+                <a:solidFill>
+                  <a:schemeClr val="tx1"/>
+                </a:solidFill>
+              </a:rPr>
+              <a:t>Strategy for maintain retention need to be develop, since our main business is retail hence, we must make our customer to do repeat order, or periodical order.</a:t>
             </a:r>
           </a:p>
         </p:txBody>

</xml_diff>